<commit_message>
updated 5.3 visuals - removed first empty slide
</commit_message>
<xml_diff>
--- a/5-3 Visuals.pptx
+++ b/5-3 Visuals.pptx
@@ -5,11 +5,10 @@
     <p:sldMasterId id="2147483660" r:id="rId1"/>
   </p:sldMasterIdLst>
   <p:sldIdLst>
-    <p:sldId id="257" r:id="rId2"/>
-    <p:sldId id="259" r:id="rId3"/>
-    <p:sldId id="260" r:id="rId4"/>
-    <p:sldId id="258" r:id="rId5"/>
-    <p:sldId id="256" r:id="rId6"/>
+    <p:sldId id="259" r:id="rId2"/>
+    <p:sldId id="260" r:id="rId3"/>
+    <p:sldId id="258" r:id="rId4"/>
+    <p:sldId id="256" r:id="rId5"/>
   </p:sldIdLst>
   <p:sldSz cx="10058400" cy="7772400"/>
   <p:notesSz cx="6858000" cy="9144000"/>
@@ -6222,36 +6221,6 @@
           <a:chExt cx="0" cy="0"/>
         </a:xfrm>
       </p:grpSpPr>
-    </p:spTree>
-    <p:extLst>
-      <p:ext uri="{BB962C8B-B14F-4D97-AF65-F5344CB8AC3E}">
-        <p14:creationId xmlns:p14="http://schemas.microsoft.com/office/powerpoint/2010/main" val="1842139842"/>
-      </p:ext>
-    </p:extLst>
-  </p:cSld>
-  <p:clrMapOvr>
-    <a:masterClrMapping/>
-  </p:clrMapOvr>
-</p:sld>
-</file>
-
-<file path=ppt/slides/slide2.xml><?xml version="1.0" encoding="utf-8"?>
-<p:sld xmlns:a="http://schemas.openxmlformats.org/drawingml/2006/main" xmlns:r="http://schemas.openxmlformats.org/officeDocument/2006/relationships" xmlns:p="http://schemas.openxmlformats.org/presentationml/2006/main">
-  <p:cSld>
-    <p:spTree>
-      <p:nvGrpSpPr>
-        <p:cNvPr id="1" name=""/>
-        <p:cNvGrpSpPr/>
-        <p:nvPr/>
-      </p:nvGrpSpPr>
-      <p:grpSpPr>
-        <a:xfrm>
-          <a:off x="0" y="0"/>
-          <a:ext cx="0" cy="0"/>
-          <a:chOff x="0" y="0"/>
-          <a:chExt cx="0" cy="0"/>
-        </a:xfrm>
-      </p:grpSpPr>
       <p:sp>
         <p:nvSpPr>
           <p:cNvPr id="2" name="Oval 1">
@@ -6324,7 +6293,7 @@
 </p:sld>
 </file>
 
-<file path=ppt/slides/slide3.xml><?xml version="1.0" encoding="utf-8"?>
+<file path=ppt/slides/slide2.xml><?xml version="1.0" encoding="utf-8"?>
 <p:sld xmlns:a="http://schemas.openxmlformats.org/drawingml/2006/main" xmlns:r="http://schemas.openxmlformats.org/officeDocument/2006/relationships" xmlns:p="http://schemas.openxmlformats.org/presentationml/2006/main">
   <p:cSld>
     <p:spTree>
@@ -7629,7 +7598,7 @@
 </p:sld>
 </file>
 
-<file path=ppt/slides/slide4.xml><?xml version="1.0" encoding="utf-8"?>
+<file path=ppt/slides/slide3.xml><?xml version="1.0" encoding="utf-8"?>
 <p:sld xmlns:a="http://schemas.openxmlformats.org/drawingml/2006/main" xmlns:r="http://schemas.openxmlformats.org/officeDocument/2006/relationships" xmlns:p="http://schemas.openxmlformats.org/presentationml/2006/main">
   <p:cSld>
     <p:spTree>
@@ -7687,7 +7656,7 @@
 </p:sld>
 </file>
 
-<file path=ppt/slides/slide5.xml><?xml version="1.0" encoding="utf-8"?>
+<file path=ppt/slides/slide4.xml><?xml version="1.0" encoding="utf-8"?>
 <p:sld xmlns:a="http://schemas.openxmlformats.org/drawingml/2006/main" xmlns:r="http://schemas.openxmlformats.org/officeDocument/2006/relationships" xmlns:p="http://schemas.openxmlformats.org/presentationml/2006/main">
   <p:cSld>
     <p:spTree>

</xml_diff>